<commit_message>
yet more tweaks to the first lecture
</commit_message>
<xml_diff>
--- a/slides/lecture_1.pptx
+++ b/slides/lecture_1.pptx
@@ -5,7 +5,7 @@
     <p:sldMasterId id="2147483648" r:id="rId1"/>
   </p:sldMasterIdLst>
   <p:notesMasterIdLst>
-    <p:notesMasterId r:id="rId25"/>
+    <p:notesMasterId r:id="rId26"/>
   </p:notesMasterIdLst>
   <p:sldIdLst>
     <p:sldId id="256" r:id="rId2"/>
@@ -13,24 +13,25 @@
     <p:sldId id="263" r:id="rId4"/>
     <p:sldId id="264" r:id="rId5"/>
     <p:sldId id="265" r:id="rId6"/>
-    <p:sldId id="266" r:id="rId7"/>
-    <p:sldId id="267" r:id="rId8"/>
-    <p:sldId id="269" r:id="rId9"/>
-    <p:sldId id="268" r:id="rId10"/>
-    <p:sldId id="270" r:id="rId11"/>
-    <p:sldId id="271" r:id="rId12"/>
-    <p:sldId id="272" r:id="rId13"/>
-    <p:sldId id="273" r:id="rId14"/>
-    <p:sldId id="258" r:id="rId15"/>
-    <p:sldId id="257" r:id="rId16"/>
-    <p:sldId id="259" r:id="rId17"/>
-    <p:sldId id="260" r:id="rId18"/>
-    <p:sldId id="261" r:id="rId19"/>
-    <p:sldId id="274" r:id="rId20"/>
-    <p:sldId id="275" r:id="rId21"/>
-    <p:sldId id="276" r:id="rId22"/>
-    <p:sldId id="277" r:id="rId23"/>
-    <p:sldId id="278" r:id="rId24"/>
+    <p:sldId id="279" r:id="rId7"/>
+    <p:sldId id="266" r:id="rId8"/>
+    <p:sldId id="267" r:id="rId9"/>
+    <p:sldId id="269" r:id="rId10"/>
+    <p:sldId id="268" r:id="rId11"/>
+    <p:sldId id="270" r:id="rId12"/>
+    <p:sldId id="271" r:id="rId13"/>
+    <p:sldId id="272" r:id="rId14"/>
+    <p:sldId id="273" r:id="rId15"/>
+    <p:sldId id="258" r:id="rId16"/>
+    <p:sldId id="257" r:id="rId17"/>
+    <p:sldId id="259" r:id="rId18"/>
+    <p:sldId id="260" r:id="rId19"/>
+    <p:sldId id="261" r:id="rId20"/>
+    <p:sldId id="274" r:id="rId21"/>
+    <p:sldId id="275" r:id="rId22"/>
+    <p:sldId id="276" r:id="rId23"/>
+    <p:sldId id="277" r:id="rId24"/>
+    <p:sldId id="278" r:id="rId25"/>
   </p:sldIdLst>
   <p:sldSz cx="9144000" cy="6858000" type="screen4x3"/>
   <p:notesSz cx="6858000" cy="9144000"/>
@@ -547,7 +548,7 @@
           <a:p>
             <a:fld id="{18BABF65-772B-B64A-A821-703BBEDEF1C4}" type="slidenum">
               <a:rPr lang="en-US" smtClean="0"/>
-              <a:t>15</a:t>
+              <a:t>16</a:t>
             </a:fld>
             <a:endParaRPr lang="en-US"/>
           </a:p>
@@ -641,7 +642,7 @@
           <a:p>
             <a:fld id="{18BABF65-772B-B64A-A821-703BBEDEF1C4}" type="slidenum">
               <a:rPr lang="en-US" smtClean="0"/>
-              <a:t>16</a:t>
+              <a:t>17</a:t>
             </a:fld>
             <a:endParaRPr lang="en-US"/>
           </a:p>
@@ -725,7 +726,7 @@
           <a:p>
             <a:fld id="{18BABF65-772B-B64A-A821-703BBEDEF1C4}" type="slidenum">
               <a:rPr lang="en-US" smtClean="0"/>
-              <a:t>17</a:t>
+              <a:t>18</a:t>
             </a:fld>
             <a:endParaRPr lang="en-US"/>
           </a:p>
@@ -826,7 +827,7 @@
           <a:p>
             <a:fld id="{18BABF65-772B-B64A-A821-703BBEDEF1C4}" type="slidenum">
               <a:rPr lang="en-US" smtClean="0"/>
-              <a:t>18</a:t>
+              <a:t>19</a:t>
             </a:fld>
             <a:endParaRPr lang="en-US"/>
           </a:p>
@@ -966,7 +967,7 @@
           <a:p>
             <a:fld id="{18BABF65-772B-B64A-A821-703BBEDEF1C4}" type="slidenum">
               <a:rPr lang="en-US" smtClean="0"/>
-              <a:t>23</a:t>
+              <a:t>24</a:t>
             </a:fld>
             <a:endParaRPr lang="en-US"/>
           </a:p>
@@ -4099,8 +4100,8 @@
         </p:nvSpPr>
         <p:spPr>
           <a:xfrm>
-            <a:off x="1745617" y="1043732"/>
-            <a:ext cx="5652809" cy="2492990"/>
+            <a:off x="2593677" y="1043732"/>
+            <a:ext cx="3956682" cy="1631216"/>
           </a:xfrm>
           <a:prstGeom prst="rect">
             <a:avLst/>
@@ -4135,21 +4136,7 @@
             <a:pPr algn="ctr"/>
             <a:r>
               <a:rPr lang="en-US" sz="2800" dirty="0" smtClean="0"/>
-              <a:t>How best to aggregate opinions?</a:t>
-            </a:r>
-          </a:p>
-          <a:p>
-            <a:pPr algn="ctr"/>
-            <a:r>
-              <a:rPr lang="en-US" sz="2800" dirty="0" smtClean="0"/>
-              <a:t>How big a crowd do you need?</a:t>
-            </a:r>
-          </a:p>
-          <a:p>
-            <a:pPr algn="ctr"/>
-            <a:r>
-              <a:rPr lang="en-US" sz="2800" dirty="0" smtClean="0"/>
-              <a:t>What is the effect of social influence?</a:t>
+              <a:t>When are crowds “wise”?</a:t>
             </a:r>
           </a:p>
         </p:txBody>
@@ -4157,7 +4144,7 @@
     </p:spTree>
     <p:extLst>
       <p:ext uri="{BB962C8B-B14F-4D97-AF65-F5344CB8AC3E}">
-        <p14:creationId xmlns:p14="http://schemas.microsoft.com/office/powerpoint/2010/main" val="789065968"/>
+        <p14:creationId xmlns:p14="http://schemas.microsoft.com/office/powerpoint/2010/main" val="3004424881"/>
       </p:ext>
     </p:extLst>
   </p:cSld>
@@ -4192,8 +4179,8 @@
         </p:nvSpPr>
         <p:spPr>
           <a:xfrm>
-            <a:off x="1863178" y="1043732"/>
-            <a:ext cx="5417694" cy="1631216"/>
+            <a:off x="1745617" y="1043732"/>
+            <a:ext cx="5652809" cy="2492990"/>
           </a:xfrm>
           <a:prstGeom prst="rect">
             <a:avLst/>
@@ -4228,7 +4215,21 @@
             <a:pPr algn="ctr"/>
             <a:r>
               <a:rPr lang="en-US" sz="2800" dirty="0" smtClean="0"/>
-              <a:t>What is the underlying mechanism?</a:t>
+              <a:t>How best to aggregate opinions?</a:t>
+            </a:r>
+          </a:p>
+          <a:p>
+            <a:pPr algn="ctr"/>
+            <a:r>
+              <a:rPr lang="en-US" sz="2800" dirty="0" smtClean="0"/>
+              <a:t>How big a crowd do you need?</a:t>
+            </a:r>
+          </a:p>
+          <a:p>
+            <a:pPr algn="ctr"/>
+            <a:r>
+              <a:rPr lang="en-US" sz="2800" dirty="0" smtClean="0"/>
+              <a:t>What is the effect of social influence?</a:t>
             </a:r>
           </a:p>
         </p:txBody>
@@ -4236,7 +4237,7 @@
     </p:spTree>
     <p:extLst>
       <p:ext uri="{BB962C8B-B14F-4D97-AF65-F5344CB8AC3E}">
-        <p14:creationId xmlns:p14="http://schemas.microsoft.com/office/powerpoint/2010/main" val="3201777277"/>
+        <p14:creationId xmlns:p14="http://schemas.microsoft.com/office/powerpoint/2010/main" val="789065968"/>
       </p:ext>
     </p:extLst>
   </p:cSld>
@@ -4271,8 +4272,8 @@
         </p:nvSpPr>
         <p:spPr>
           <a:xfrm>
-            <a:off x="1137493" y="1043732"/>
-            <a:ext cx="6869063" cy="3662541"/>
+            <a:off x="1863178" y="1043732"/>
+            <a:ext cx="5417694" cy="1631216"/>
           </a:xfrm>
           <a:prstGeom prst="rect">
             <a:avLst/>
@@ -4292,44 +4293,22 @@
                   <a:srgbClr val="FFFF00"/>
                 </a:solidFill>
               </a:rPr>
-              <a:t>Experimental design</a:t>
-            </a:r>
-          </a:p>
-          <a:p>
-            <a:pPr algn="ctr"/>
-            <a:endParaRPr lang="en-US" sz="2800" dirty="0" smtClean="0"/>
-          </a:p>
-          <a:p>
-            <a:pPr algn="ctr"/>
-            <a:endParaRPr lang="en-US" sz="2800" dirty="0"/>
+              <a:t>Research question</a:t>
+            </a:r>
+          </a:p>
+          <a:p>
+            <a:pPr algn="ctr"/>
+            <a:endParaRPr lang="en-US" sz="3600" dirty="0" smtClean="0">
+              <a:solidFill>
+                <a:srgbClr val="FFFF00"/>
+              </a:solidFill>
+            </a:endParaRPr>
           </a:p>
           <a:p>
             <a:pPr algn="ctr"/>
             <a:r>
               <a:rPr lang="en-US" sz="2800" dirty="0" smtClean="0"/>
-              <a:t>1. Systematically construct thousands of tasks</a:t>
-            </a:r>
-          </a:p>
-          <a:p>
-            <a:pPr algn="ctr"/>
-            <a:endParaRPr lang="en-US" sz="2800" dirty="0"/>
-          </a:p>
-          <a:p>
-            <a:pPr algn="ctr"/>
-            <a:r>
-              <a:rPr lang="en-US" sz="2800" dirty="0" smtClean="0"/>
-              <a:t>2. Recruit a crowd to complete the tasks</a:t>
-            </a:r>
-          </a:p>
-          <a:p>
-            <a:pPr algn="ctr"/>
-            <a:endParaRPr lang="en-US" sz="2800" dirty="0"/>
-          </a:p>
-          <a:p>
-            <a:pPr algn="ctr"/>
-            <a:r>
-              <a:rPr lang="en-US" sz="2800" dirty="0" smtClean="0"/>
-              <a:t>3. Analyze the responses</a:t>
+              <a:t>What is the underlying mechanism?</a:t>
             </a:r>
           </a:p>
         </p:txBody>
@@ -4337,7 +4316,7 @@
     </p:spTree>
     <p:extLst>
       <p:ext uri="{BB962C8B-B14F-4D97-AF65-F5344CB8AC3E}">
-        <p14:creationId xmlns:p14="http://schemas.microsoft.com/office/powerpoint/2010/main" val="1709868168"/>
+        <p14:creationId xmlns:p14="http://schemas.microsoft.com/office/powerpoint/2010/main" val="3201777277"/>
       </p:ext>
     </p:extLst>
   </p:cSld>
@@ -4372,8 +4351,8 @@
         </p:nvSpPr>
         <p:spPr>
           <a:xfrm>
-            <a:off x="1682879" y="1043732"/>
-            <a:ext cx="5778294" cy="646331"/>
+            <a:off x="1137493" y="1043732"/>
+            <a:ext cx="6869063" cy="3662541"/>
           </a:xfrm>
           <a:prstGeom prst="rect">
             <a:avLst/>
@@ -4393,7 +4372,44 @@
                   <a:srgbClr val="FFFF00"/>
                 </a:solidFill>
               </a:rPr>
-              <a:t>Studying crowds, with crowds</a:t>
+              <a:t>Experimental design</a:t>
+            </a:r>
+          </a:p>
+          <a:p>
+            <a:pPr algn="ctr"/>
+            <a:endParaRPr lang="en-US" sz="2800" dirty="0" smtClean="0"/>
+          </a:p>
+          <a:p>
+            <a:pPr algn="ctr"/>
+            <a:endParaRPr lang="en-US" sz="2800" dirty="0"/>
+          </a:p>
+          <a:p>
+            <a:pPr algn="ctr"/>
+            <a:r>
+              <a:rPr lang="en-US" sz="2800" dirty="0" smtClean="0"/>
+              <a:t>1. Systematically construct thousands of tasks</a:t>
+            </a:r>
+          </a:p>
+          <a:p>
+            <a:pPr algn="ctr"/>
+            <a:endParaRPr lang="en-US" sz="2800" dirty="0"/>
+          </a:p>
+          <a:p>
+            <a:pPr algn="ctr"/>
+            <a:r>
+              <a:rPr lang="en-US" sz="2800" dirty="0" smtClean="0"/>
+              <a:t>2. Recruit a crowd to complete the tasks</a:t>
+            </a:r>
+          </a:p>
+          <a:p>
+            <a:pPr algn="ctr"/>
+            <a:endParaRPr lang="en-US" sz="2800" dirty="0"/>
+          </a:p>
+          <a:p>
+            <a:pPr algn="ctr"/>
+            <a:r>
+              <a:rPr lang="en-US" sz="2800" dirty="0" smtClean="0"/>
+              <a:t>3. Analyze the responses</a:t>
             </a:r>
           </a:p>
         </p:txBody>
@@ -4401,7 +4417,7 @@
     </p:spTree>
     <p:extLst>
       <p:ext uri="{BB962C8B-B14F-4D97-AF65-F5344CB8AC3E}">
-        <p14:creationId xmlns:p14="http://schemas.microsoft.com/office/powerpoint/2010/main" val="227328283"/>
+        <p14:creationId xmlns:p14="http://schemas.microsoft.com/office/powerpoint/2010/main" val="1709868168"/>
       </p:ext>
     </p:extLst>
   </p:cSld>
@@ -4430,6 +4446,70 @@
       </p:grpSpPr>
       <p:sp>
         <p:nvSpPr>
+          <p:cNvPr id="3" name="TextBox 2"/>
+          <p:cNvSpPr txBox="1"/>
+          <p:nvPr/>
+        </p:nvSpPr>
+        <p:spPr>
+          <a:xfrm>
+            <a:off x="1682879" y="1043732"/>
+            <a:ext cx="5778294" cy="646331"/>
+          </a:xfrm>
+          <a:prstGeom prst="rect">
+            <a:avLst/>
+          </a:prstGeom>
+          <a:noFill/>
+        </p:spPr>
+        <p:txBody>
+          <a:bodyPr wrap="none" rtlCol="0">
+            <a:spAutoFit/>
+          </a:bodyPr>
+          <a:lstStyle/>
+          <a:p>
+            <a:pPr algn="ctr"/>
+            <a:r>
+              <a:rPr lang="en-US" sz="3600" dirty="0" smtClean="0">
+                <a:solidFill>
+                  <a:srgbClr val="FFFF00"/>
+                </a:solidFill>
+              </a:rPr>
+              <a:t>Studying crowds, with crowds</a:t>
+            </a:r>
+          </a:p>
+        </p:txBody>
+      </p:sp>
+    </p:spTree>
+    <p:extLst>
+      <p:ext uri="{BB962C8B-B14F-4D97-AF65-F5344CB8AC3E}">
+        <p14:creationId xmlns:p14="http://schemas.microsoft.com/office/powerpoint/2010/main" val="227328283"/>
+      </p:ext>
+    </p:extLst>
+  </p:cSld>
+  <p:clrMapOvr>
+    <a:masterClrMapping/>
+  </p:clrMapOvr>
+</p:sld>
+</file>
+
+<file path=ppt/slides/slide15.xml><?xml version="1.0" encoding="utf-8"?>
+<p:sld xmlns:a="http://schemas.openxmlformats.org/drawingml/2006/main" xmlns:r="http://schemas.openxmlformats.org/officeDocument/2006/relationships" xmlns:p="http://schemas.openxmlformats.org/presentationml/2006/main">
+  <p:cSld>
+    <p:spTree>
+      <p:nvGrpSpPr>
+        <p:cNvPr id="1" name=""/>
+        <p:cNvGrpSpPr/>
+        <p:nvPr/>
+      </p:nvGrpSpPr>
+      <p:grpSpPr>
+        <a:xfrm>
+          <a:off x="0" y="0"/>
+          <a:ext cx="0" cy="0"/>
+          <a:chOff x="0" y="0"/>
+          <a:chExt cx="0" cy="0"/>
+        </a:xfrm>
+      </p:grpSpPr>
+      <p:sp>
+        <p:nvSpPr>
           <p:cNvPr id="2" name="TextBox 1"/>
           <p:cNvSpPr txBox="1"/>
           <p:nvPr/>
@@ -4591,7 +4671,7 @@
 </p:sld>
 </file>
 
-<file path=ppt/slides/slide15.xml><?xml version="1.0" encoding="utf-8"?>
+<file path=ppt/slides/slide16.xml><?xml version="1.0" encoding="utf-8"?>
 <p:sld xmlns:a="http://schemas.openxmlformats.org/drawingml/2006/main" xmlns:r="http://schemas.openxmlformats.org/officeDocument/2006/relationships" xmlns:p="http://schemas.openxmlformats.org/presentationml/2006/main">
   <p:cSld>
     <p:spTree>
@@ -4712,7 +4792,7 @@
 </p:sld>
 </file>
 
-<file path=ppt/slides/slide16.xml><?xml version="1.0" encoding="utf-8"?>
+<file path=ppt/slides/slide17.xml><?xml version="1.0" encoding="utf-8"?>
 <p:sld xmlns:a="http://schemas.openxmlformats.org/drawingml/2006/main" xmlns:r="http://schemas.openxmlformats.org/officeDocument/2006/relationships" xmlns:p="http://schemas.openxmlformats.org/presentationml/2006/main">
   <p:cSld>
     <p:spTree>
@@ -4817,7 +4897,7 @@
 </p:sld>
 </file>
 
-<file path=ppt/slides/slide17.xml><?xml version="1.0" encoding="utf-8"?>
+<file path=ppt/slides/slide18.xml><?xml version="1.0" encoding="utf-8"?>
 <p:sld xmlns:a="http://schemas.openxmlformats.org/drawingml/2006/main" xmlns:r="http://schemas.openxmlformats.org/officeDocument/2006/relationships" xmlns:p="http://schemas.openxmlformats.org/presentationml/2006/main">
   <p:cSld>
     <p:spTree>
@@ -4983,137 +5063,6 @@
 </p:sld>
 </file>
 
-<file path=ppt/slides/slide18.xml><?xml version="1.0" encoding="utf-8"?>
-<p:sld xmlns:a="http://schemas.openxmlformats.org/drawingml/2006/main" xmlns:r="http://schemas.openxmlformats.org/officeDocument/2006/relationships" xmlns:p="http://schemas.openxmlformats.org/presentationml/2006/main">
-  <p:cSld>
-    <p:spTree>
-      <p:nvGrpSpPr>
-        <p:cNvPr id="1" name=""/>
-        <p:cNvGrpSpPr/>
-        <p:nvPr/>
-      </p:nvGrpSpPr>
-      <p:grpSpPr>
-        <a:xfrm>
-          <a:off x="0" y="0"/>
-          <a:ext cx="0" cy="0"/>
-          <a:chOff x="0" y="0"/>
-          <a:chExt cx="0" cy="0"/>
-        </a:xfrm>
-      </p:grpSpPr>
-      <p:sp>
-        <p:nvSpPr>
-          <p:cNvPr id="2" name="TextBox 1"/>
-          <p:cNvSpPr txBox="1"/>
-          <p:nvPr/>
-        </p:nvSpPr>
-        <p:spPr>
-          <a:xfrm>
-            <a:off x="4079875" y="1476375"/>
-            <a:ext cx="184666" cy="369332"/>
-          </a:xfrm>
-          <a:prstGeom prst="rect">
-            <a:avLst/>
-          </a:prstGeom>
-          <a:noFill/>
-        </p:spPr>
-        <p:txBody>
-          <a:bodyPr wrap="none" rtlCol="0">
-            <a:spAutoFit/>
-          </a:bodyPr>
-          <a:lstStyle/>
-          <a:p>
-            <a:r>
-              <a:rPr lang="en-US" dirty="0" smtClean="0"/>
-              <a:t> </a:t>
-            </a:r>
-            <a:endParaRPr lang="en-US" dirty="0"/>
-          </a:p>
-        </p:txBody>
-      </p:sp>
-      <p:sp>
-        <p:nvSpPr>
-          <p:cNvPr id="3" name="TextBox 2"/>
-          <p:cNvSpPr txBox="1"/>
-          <p:nvPr/>
-        </p:nvSpPr>
-        <p:spPr>
-          <a:xfrm>
-            <a:off x="2384494" y="1043732"/>
-            <a:ext cx="4375016" cy="2492990"/>
-          </a:xfrm>
-          <a:prstGeom prst="rect">
-            <a:avLst/>
-          </a:prstGeom>
-          <a:noFill/>
-        </p:spPr>
-        <p:txBody>
-          <a:bodyPr wrap="none" rtlCol="0">
-            <a:spAutoFit/>
-          </a:bodyPr>
-          <a:lstStyle/>
-          <a:p>
-            <a:pPr algn="ctr"/>
-            <a:r>
-              <a:rPr lang="en-US" sz="3600" dirty="0" smtClean="0">
-                <a:solidFill>
-                  <a:srgbClr val="FFFF00"/>
-                </a:solidFill>
-              </a:rPr>
-              <a:t>India vs. Pakistan</a:t>
-            </a:r>
-          </a:p>
-          <a:p>
-            <a:pPr algn="ctr"/>
-            <a:r>
-              <a:rPr lang="en-US" sz="2800" dirty="0" smtClean="0"/>
-              <a:t>Cricket World Cup, Game 4</a:t>
-            </a:r>
-          </a:p>
-          <a:p>
-            <a:pPr algn="ctr"/>
-            <a:endParaRPr lang="en-US" sz="3600" dirty="0">
-              <a:solidFill>
-                <a:srgbClr val="FFFF00"/>
-              </a:solidFill>
-            </a:endParaRPr>
-          </a:p>
-          <a:p>
-            <a:pPr algn="ctr"/>
-            <a:r>
-              <a:rPr lang="en-US" sz="2800" dirty="0" smtClean="0"/>
-              <a:t>How many runs do you think </a:t>
-            </a:r>
-          </a:p>
-          <a:p>
-            <a:pPr algn="ctr"/>
-            <a:r>
-              <a:rPr lang="en-US" sz="2800" dirty="0" smtClean="0"/>
-              <a:t>each team will score?</a:t>
-            </a:r>
-            <a:endParaRPr lang="en-US" sz="2800" dirty="0"/>
-          </a:p>
-        </p:txBody>
-      </p:sp>
-    </p:spTree>
-    <p:extLst>
-      <p:ext uri="{BB962C8B-B14F-4D97-AF65-F5344CB8AC3E}">
-        <p14:creationId xmlns:p14="http://schemas.microsoft.com/office/powerpoint/2010/main" val="1689619240"/>
-      </p:ext>
-    </p:extLst>
-  </p:cSld>
-  <p:clrMapOvr>
-    <a:masterClrMapping/>
-  </p:clrMapOvr>
-  <p:timing>
-    <p:tnLst>
-      <p:par>
-        <p:cTn xmlns:p14="http://schemas.microsoft.com/office/powerpoint/2010/main" id="1" dur="indefinite" restart="never" nodeType="tmRoot"/>
-      </p:par>
-    </p:tnLst>
-  </p:timing>
-</p:sld>
-</file>
-
 <file path=ppt/slides/slide19.xml><?xml version="1.0" encoding="utf-8"?>
 <p:sld xmlns:a="http://schemas.openxmlformats.org/drawingml/2006/main" xmlns:r="http://schemas.openxmlformats.org/officeDocument/2006/relationships" xmlns:p="http://schemas.openxmlformats.org/presentationml/2006/main">
   <p:cSld>
@@ -5169,8 +5118,8 @@
         </p:nvSpPr>
         <p:spPr>
           <a:xfrm>
-            <a:off x="2636805" y="1043732"/>
-            <a:ext cx="3870421" cy="2492990"/>
+            <a:off x="2384494" y="1043732"/>
+            <a:ext cx="4375016" cy="2492990"/>
           </a:xfrm>
           <a:prstGeom prst="rect">
             <a:avLst/>
@@ -5190,14 +5139,14 @@
                   <a:srgbClr val="FFFF00"/>
                 </a:solidFill>
               </a:rPr>
-              <a:t>Assignment</a:t>
+              <a:t>India vs. Pakistan</a:t>
             </a:r>
           </a:p>
           <a:p>
             <a:pPr algn="ctr"/>
             <a:r>
               <a:rPr lang="en-US" sz="2800" dirty="0" smtClean="0"/>
-              <a:t>literature review</a:t>
+              <a:t>Cricket World Cup, Game 4</a:t>
             </a:r>
           </a:p>
           <a:p>
@@ -5212,22 +5161,23 @@
             <a:pPr algn="ctr"/>
             <a:r>
               <a:rPr lang="en-US" sz="2800" dirty="0" smtClean="0"/>
-              <a:t>Document past studies</a:t>
+              <a:t>How many runs do you think </a:t>
             </a:r>
           </a:p>
           <a:p>
             <a:pPr algn="ctr"/>
             <a:r>
               <a:rPr lang="en-US" sz="2800" dirty="0" smtClean="0"/>
-              <a:t>on the wisdom of crowds</a:t>
-            </a:r>
+              <a:t>each team will score?</a:t>
+            </a:r>
+            <a:endParaRPr lang="en-US" sz="2800" dirty="0"/>
           </a:p>
         </p:txBody>
       </p:sp>
     </p:spTree>
     <p:extLst>
       <p:ext uri="{BB962C8B-B14F-4D97-AF65-F5344CB8AC3E}">
-        <p14:creationId xmlns:p14="http://schemas.microsoft.com/office/powerpoint/2010/main" val="1351485586"/>
+        <p14:creationId xmlns:p14="http://schemas.microsoft.com/office/powerpoint/2010/main" val="1689619240"/>
       </p:ext>
     </p:extLst>
   </p:cSld>
@@ -5430,8 +5380,8 @@
         </p:nvSpPr>
         <p:spPr>
           <a:xfrm>
-            <a:off x="2729907" y="1043732"/>
-            <a:ext cx="3684222" cy="2062103"/>
+            <a:off x="2636805" y="1043732"/>
+            <a:ext cx="3870421" cy="2492990"/>
           </a:xfrm>
           <a:prstGeom prst="rect">
             <a:avLst/>
@@ -5458,7 +5408,7 @@
             <a:pPr algn="ctr"/>
             <a:r>
               <a:rPr lang="en-US" sz="2800" dirty="0" smtClean="0"/>
-              <a:t>brainstorm tasks</a:t>
+              <a:t>literature review</a:t>
             </a:r>
           </a:p>
           <a:p>
@@ -5473,7 +5423,14 @@
             <a:pPr algn="ctr"/>
             <a:r>
               <a:rPr lang="en-US" sz="2800" dirty="0" smtClean="0"/>
-              <a:t>be creative, but realistic</a:t>
+              <a:t>Document past studies</a:t>
+            </a:r>
+          </a:p>
+          <a:p>
+            <a:pPr algn="ctr"/>
+            <a:r>
+              <a:rPr lang="en-US" sz="2800" dirty="0" smtClean="0"/>
+              <a:t>on the wisdom of crowds</a:t>
             </a:r>
           </a:p>
         </p:txBody>
@@ -5481,7 +5438,7 @@
     </p:spTree>
     <p:extLst>
       <p:ext uri="{BB962C8B-B14F-4D97-AF65-F5344CB8AC3E}">
-        <p14:creationId xmlns:p14="http://schemas.microsoft.com/office/powerpoint/2010/main" val="2839568729"/>
+        <p14:creationId xmlns:p14="http://schemas.microsoft.com/office/powerpoint/2010/main" val="1351485586"/>
       </p:ext>
     </p:extLst>
   </p:cSld>
@@ -5553,8 +5510,8 @@
         </p:nvSpPr>
         <p:spPr>
           <a:xfrm>
-            <a:off x="1595974" y="1043732"/>
-            <a:ext cx="5952095" cy="2492990"/>
+            <a:off x="2729907" y="1043732"/>
+            <a:ext cx="3684222" cy="2062103"/>
           </a:xfrm>
           <a:prstGeom prst="rect">
             <a:avLst/>
@@ -5574,27 +5531,14 @@
                   <a:srgbClr val="FFFF00"/>
                 </a:solidFill>
               </a:rPr>
-              <a:t>Assignment </a:t>
-            </a:r>
-            <a:r>
-              <a:rPr lang="en-US" sz="3600" dirty="0"/>
-              <a:t>[ optional </a:t>
-            </a:r>
-            <a:r>
-              <a:rPr lang="en-US" sz="3600" dirty="0" smtClean="0"/>
-              <a:t>]</a:t>
-            </a:r>
-            <a:endParaRPr lang="en-US" sz="3600" dirty="0" smtClean="0">
-              <a:solidFill>
-                <a:srgbClr val="FFFF00"/>
-              </a:solidFill>
-            </a:endParaRPr>
+              <a:t>Assignment</a:t>
+            </a:r>
           </a:p>
           <a:p>
             <a:pPr algn="ctr"/>
             <a:r>
               <a:rPr lang="en-US" sz="2800" dirty="0" smtClean="0"/>
-              <a:t>apply to design experiment platform</a:t>
+              <a:t>brainstorm tasks</a:t>
             </a:r>
           </a:p>
           <a:p>
@@ -5606,30 +5550,18 @@
             </a:endParaRPr>
           </a:p>
           <a:p>
+            <a:pPr algn="ctr"/>
             <a:r>
               <a:rPr lang="en-US" sz="2800" dirty="0" smtClean="0"/>
-              <a:t>teams should have experience with</a:t>
-            </a:r>
-          </a:p>
-          <a:p>
-            <a:r>
-              <a:rPr lang="en-US" sz="2800" dirty="0" smtClean="0"/>
-              <a:t>HTML</a:t>
-            </a:r>
-            <a:r>
-              <a:rPr lang="en-US" sz="2800" dirty="0"/>
-              <a:t>, CSS, PHP, JavaScript, and MySQL </a:t>
-            </a:r>
-            <a:endParaRPr lang="en-US" sz="2800" dirty="0">
-              <a:effectLst/>
-            </a:endParaRPr>
+              <a:t>be creative, but realistic</a:t>
+            </a:r>
           </a:p>
         </p:txBody>
       </p:sp>
     </p:spTree>
     <p:extLst>
       <p:ext uri="{BB962C8B-B14F-4D97-AF65-F5344CB8AC3E}">
-        <p14:creationId xmlns:p14="http://schemas.microsoft.com/office/powerpoint/2010/main" val="2032059225"/>
+        <p14:creationId xmlns:p14="http://schemas.microsoft.com/office/powerpoint/2010/main" val="2839568729"/>
       </p:ext>
     </p:extLst>
   </p:cSld>
@@ -5701,6 +5633,154 @@
         </p:nvSpPr>
         <p:spPr>
           <a:xfrm>
+            <a:off x="1595974" y="1043732"/>
+            <a:ext cx="5952095" cy="2492990"/>
+          </a:xfrm>
+          <a:prstGeom prst="rect">
+            <a:avLst/>
+          </a:prstGeom>
+          <a:noFill/>
+        </p:spPr>
+        <p:txBody>
+          <a:bodyPr wrap="none" rtlCol="0">
+            <a:spAutoFit/>
+          </a:bodyPr>
+          <a:lstStyle/>
+          <a:p>
+            <a:pPr algn="ctr"/>
+            <a:r>
+              <a:rPr lang="en-US" sz="3600" dirty="0" smtClean="0">
+                <a:solidFill>
+                  <a:srgbClr val="FFFF00"/>
+                </a:solidFill>
+              </a:rPr>
+              <a:t>Assignment </a:t>
+            </a:r>
+            <a:r>
+              <a:rPr lang="en-US" sz="3600" dirty="0"/>
+              <a:t>[ optional </a:t>
+            </a:r>
+            <a:r>
+              <a:rPr lang="en-US" sz="3600" dirty="0" smtClean="0"/>
+              <a:t>]</a:t>
+            </a:r>
+            <a:endParaRPr lang="en-US" sz="3600" dirty="0" smtClean="0">
+              <a:solidFill>
+                <a:srgbClr val="FFFF00"/>
+              </a:solidFill>
+            </a:endParaRPr>
+          </a:p>
+          <a:p>
+            <a:pPr algn="ctr"/>
+            <a:r>
+              <a:rPr lang="en-US" sz="2800" dirty="0" smtClean="0"/>
+              <a:t>apply to design experiment platform</a:t>
+            </a:r>
+          </a:p>
+          <a:p>
+            <a:pPr algn="ctr"/>
+            <a:endParaRPr lang="en-US" sz="3600" dirty="0">
+              <a:solidFill>
+                <a:srgbClr val="FFFF00"/>
+              </a:solidFill>
+            </a:endParaRPr>
+          </a:p>
+          <a:p>
+            <a:r>
+              <a:rPr lang="en-US" sz="2800" dirty="0" smtClean="0"/>
+              <a:t>teams should have experience with</a:t>
+            </a:r>
+          </a:p>
+          <a:p>
+            <a:r>
+              <a:rPr lang="en-US" sz="2800" dirty="0" smtClean="0"/>
+              <a:t>HTML</a:t>
+            </a:r>
+            <a:r>
+              <a:rPr lang="en-US" sz="2800" dirty="0"/>
+              <a:t>, CSS, PHP, JavaScript, and MySQL </a:t>
+            </a:r>
+            <a:endParaRPr lang="en-US" sz="2800" dirty="0">
+              <a:effectLst/>
+            </a:endParaRPr>
+          </a:p>
+        </p:txBody>
+      </p:sp>
+    </p:spTree>
+    <p:extLst>
+      <p:ext uri="{BB962C8B-B14F-4D97-AF65-F5344CB8AC3E}">
+        <p14:creationId xmlns:p14="http://schemas.microsoft.com/office/powerpoint/2010/main" val="2032059225"/>
+      </p:ext>
+    </p:extLst>
+  </p:cSld>
+  <p:clrMapOvr>
+    <a:masterClrMapping/>
+  </p:clrMapOvr>
+  <p:timing>
+    <p:tnLst>
+      <p:par>
+        <p:cTn xmlns:p14="http://schemas.microsoft.com/office/powerpoint/2010/main" id="1" dur="indefinite" restart="never" nodeType="tmRoot"/>
+      </p:par>
+    </p:tnLst>
+  </p:timing>
+</p:sld>
+</file>
+
+<file path=ppt/slides/slide23.xml><?xml version="1.0" encoding="utf-8"?>
+<p:sld xmlns:a="http://schemas.openxmlformats.org/drawingml/2006/main" xmlns:r="http://schemas.openxmlformats.org/officeDocument/2006/relationships" xmlns:p="http://schemas.openxmlformats.org/presentationml/2006/main">
+  <p:cSld>
+    <p:spTree>
+      <p:nvGrpSpPr>
+        <p:cNvPr id="1" name=""/>
+        <p:cNvGrpSpPr/>
+        <p:nvPr/>
+      </p:nvGrpSpPr>
+      <p:grpSpPr>
+        <a:xfrm>
+          <a:off x="0" y="0"/>
+          <a:ext cx="0" cy="0"/>
+          <a:chOff x="0" y="0"/>
+          <a:chExt cx="0" cy="0"/>
+        </a:xfrm>
+      </p:grpSpPr>
+      <p:sp>
+        <p:nvSpPr>
+          <p:cNvPr id="2" name="TextBox 1"/>
+          <p:cNvSpPr txBox="1"/>
+          <p:nvPr/>
+        </p:nvSpPr>
+        <p:spPr>
+          <a:xfrm>
+            <a:off x="4079875" y="1476375"/>
+            <a:ext cx="184666" cy="369332"/>
+          </a:xfrm>
+          <a:prstGeom prst="rect">
+            <a:avLst/>
+          </a:prstGeom>
+          <a:noFill/>
+        </p:spPr>
+        <p:txBody>
+          <a:bodyPr wrap="none" rtlCol="0">
+            <a:spAutoFit/>
+          </a:bodyPr>
+          <a:lstStyle/>
+          <a:p>
+            <a:r>
+              <a:rPr lang="en-US" dirty="0" smtClean="0"/>
+              <a:t> </a:t>
+            </a:r>
+            <a:endParaRPr lang="en-US" dirty="0"/>
+          </a:p>
+        </p:txBody>
+      </p:sp>
+      <p:sp>
+        <p:nvSpPr>
+          <p:cNvPr id="3" name="TextBox 2"/>
+          <p:cNvSpPr txBox="1"/>
+          <p:nvPr/>
+        </p:nvSpPr>
+        <p:spPr>
+          <a:xfrm>
             <a:off x="2901399" y="1043732"/>
             <a:ext cx="3341254" cy="1508105"/>
           </a:xfrm>
@@ -5765,7 +5845,7 @@
 </p:sld>
 </file>
 
-<file path=ppt/slides/slide23.xml><?xml version="1.0" encoding="utf-8"?>
+<file path=ppt/slides/slide24.xml><?xml version="1.0" encoding="utf-8"?>
 <p:sld xmlns:a="http://schemas.openxmlformats.org/drawingml/2006/main" xmlns:r="http://schemas.openxmlformats.org/officeDocument/2006/relationships" xmlns:p="http://schemas.openxmlformats.org/presentationml/2006/main">
   <p:cSld>
     <p:spTree>
@@ -6445,6 +6525,183 @@
           </a:p>
         </p:txBody>
       </p:sp>
+      <p:sp>
+        <p:nvSpPr>
+          <p:cNvPr id="3" name="TextBox 2"/>
+          <p:cNvSpPr txBox="1"/>
+          <p:nvPr/>
+        </p:nvSpPr>
+        <p:spPr>
+          <a:xfrm>
+            <a:off x="1250038" y="397400"/>
+            <a:ext cx="6643941" cy="3477876"/>
+          </a:xfrm>
+          <a:prstGeom prst="rect">
+            <a:avLst/>
+          </a:prstGeom>
+          <a:noFill/>
+        </p:spPr>
+        <p:txBody>
+          <a:bodyPr wrap="none" rtlCol="0">
+            <a:spAutoFit/>
+          </a:bodyPr>
+          <a:lstStyle/>
+          <a:p>
+            <a:pPr algn="ctr"/>
+            <a:r>
+              <a:rPr lang="en-US" sz="3600" dirty="0" smtClean="0">
+                <a:solidFill>
+                  <a:srgbClr val="FFFF00"/>
+                </a:solidFill>
+              </a:rPr>
+              <a:t>Francis Galton</a:t>
+            </a:r>
+          </a:p>
+          <a:p>
+            <a:pPr algn="ctr"/>
+            <a:r>
+              <a:rPr lang="en-US" sz="2800" i="1" dirty="0">
+                <a:solidFill>
+                  <a:srgbClr val="FFFFFF"/>
+                </a:solidFill>
+              </a:rPr>
+              <a:t>Nature</a:t>
+            </a:r>
+            <a:r>
+              <a:rPr lang="en-US" sz="2800" dirty="0">
+                <a:solidFill>
+                  <a:srgbClr val="FFFFFF"/>
+                </a:solidFill>
+              </a:rPr>
+              <a:t>, 1907</a:t>
+            </a:r>
+          </a:p>
+          <a:p>
+            <a:pPr algn="ctr"/>
+            <a:endParaRPr lang="en-US" sz="3600" dirty="0" smtClean="0">
+              <a:solidFill>
+                <a:srgbClr val="FFFF00"/>
+              </a:solidFill>
+            </a:endParaRPr>
+          </a:p>
+          <a:p>
+            <a:pPr algn="ctr"/>
+            <a:r>
+              <a:rPr lang="en-US" sz="2800" dirty="0" smtClean="0">
+                <a:solidFill>
+                  <a:srgbClr val="FFFFFF"/>
+                </a:solidFill>
+              </a:rPr>
+              <a:t>“The result is, I think, more creditable to the</a:t>
+            </a:r>
+          </a:p>
+          <a:p>
+            <a:pPr algn="ctr"/>
+            <a:r>
+              <a:rPr lang="en-US" sz="2800" dirty="0" smtClean="0">
+                <a:solidFill>
+                  <a:srgbClr val="FFFFFF"/>
+                </a:solidFill>
+              </a:rPr>
+              <a:t>trustworthiness of a democratic judgment</a:t>
+            </a:r>
+          </a:p>
+          <a:p>
+            <a:pPr algn="ctr"/>
+            <a:r>
+              <a:rPr lang="en-US" sz="2800" dirty="0">
+                <a:solidFill>
+                  <a:srgbClr val="FFFFFF"/>
+                </a:solidFill>
+              </a:rPr>
+              <a:t>	</a:t>
+            </a:r>
+            <a:r>
+              <a:rPr lang="en-US" sz="2800" dirty="0" smtClean="0">
+                <a:solidFill>
+                  <a:srgbClr val="FFFFFF"/>
+                </a:solidFill>
+              </a:rPr>
+              <a:t>than might have been expected.”</a:t>
+            </a:r>
+          </a:p>
+          <a:p>
+            <a:pPr algn="ctr"/>
+            <a:endParaRPr lang="en-US" sz="2800" dirty="0" smtClean="0">
+              <a:solidFill>
+                <a:srgbClr val="FFFFFF"/>
+              </a:solidFill>
+            </a:endParaRPr>
+          </a:p>
+        </p:txBody>
+      </p:sp>
+    </p:spTree>
+    <p:extLst>
+      <p:ext uri="{BB962C8B-B14F-4D97-AF65-F5344CB8AC3E}">
+        <p14:creationId xmlns:p14="http://schemas.microsoft.com/office/powerpoint/2010/main" val="4290621001"/>
+      </p:ext>
+    </p:extLst>
+  </p:cSld>
+  <p:clrMapOvr>
+    <a:masterClrMapping/>
+  </p:clrMapOvr>
+  <p:timing>
+    <p:tnLst>
+      <p:par>
+        <p:cTn xmlns:p14="http://schemas.microsoft.com/office/powerpoint/2010/main" id="1" dur="indefinite" restart="never" nodeType="tmRoot"/>
+      </p:par>
+    </p:tnLst>
+  </p:timing>
+</p:sld>
+</file>
+
+<file path=ppt/slides/slide7.xml><?xml version="1.0" encoding="utf-8"?>
+<p:sld xmlns:a="http://schemas.openxmlformats.org/drawingml/2006/main" xmlns:r="http://schemas.openxmlformats.org/officeDocument/2006/relationships" xmlns:p="http://schemas.openxmlformats.org/presentationml/2006/main">
+  <p:cSld>
+    <p:spTree>
+      <p:nvGrpSpPr>
+        <p:cNvPr id="1" name=""/>
+        <p:cNvGrpSpPr/>
+        <p:nvPr/>
+      </p:nvGrpSpPr>
+      <p:grpSpPr>
+        <a:xfrm>
+          <a:off x="0" y="0"/>
+          <a:ext cx="0" cy="0"/>
+          <a:chOff x="0" y="0"/>
+          <a:chExt cx="0" cy="0"/>
+        </a:xfrm>
+      </p:grpSpPr>
+      <p:sp>
+        <p:nvSpPr>
+          <p:cNvPr id="2" name="TextBox 1"/>
+          <p:cNvSpPr txBox="1"/>
+          <p:nvPr/>
+        </p:nvSpPr>
+        <p:spPr>
+          <a:xfrm>
+            <a:off x="4079875" y="1476375"/>
+            <a:ext cx="184666" cy="369332"/>
+          </a:xfrm>
+          <a:prstGeom prst="rect">
+            <a:avLst/>
+          </a:prstGeom>
+          <a:noFill/>
+        </p:spPr>
+        <p:txBody>
+          <a:bodyPr wrap="none" rtlCol="0">
+            <a:spAutoFit/>
+          </a:bodyPr>
+          <a:lstStyle/>
+          <a:p>
+            <a:r>
+              <a:rPr lang="en-US" dirty="0" smtClean="0"/>
+              <a:t> </a:t>
+            </a:r>
+            <a:endParaRPr lang="en-US" dirty="0"/>
+          </a:p>
+        </p:txBody>
+      </p:sp>
       <p:pic>
         <p:nvPicPr>
           <p:cNvPr id="4" name="Picture 3" descr="wisdomofcrowds.jpg"/>
@@ -6495,111 +6752,6 @@
 </p:sld>
 </file>
 
-<file path=ppt/slides/slide7.xml><?xml version="1.0" encoding="utf-8"?>
-<p:sld xmlns:a="http://schemas.openxmlformats.org/drawingml/2006/main" xmlns:r="http://schemas.openxmlformats.org/officeDocument/2006/relationships" xmlns:p="http://schemas.openxmlformats.org/presentationml/2006/main">
-  <p:cSld>
-    <p:spTree>
-      <p:nvGrpSpPr>
-        <p:cNvPr id="1" name=""/>
-        <p:cNvGrpSpPr/>
-        <p:nvPr/>
-      </p:nvGrpSpPr>
-      <p:grpSpPr>
-        <a:xfrm>
-          <a:off x="0" y="0"/>
-          <a:ext cx="0" cy="0"/>
-          <a:chOff x="0" y="0"/>
-          <a:chExt cx="0" cy="0"/>
-        </a:xfrm>
-      </p:grpSpPr>
-      <p:sp>
-        <p:nvSpPr>
-          <p:cNvPr id="3" name="TextBox 2"/>
-          <p:cNvSpPr txBox="1"/>
-          <p:nvPr/>
-        </p:nvSpPr>
-        <p:spPr>
-          <a:xfrm>
-            <a:off x="2070835" y="1043732"/>
-            <a:ext cx="5002341" cy="2369880"/>
-          </a:xfrm>
-          <a:prstGeom prst="rect">
-            <a:avLst/>
-          </a:prstGeom>
-          <a:noFill/>
-        </p:spPr>
-        <p:txBody>
-          <a:bodyPr wrap="none" rtlCol="0">
-            <a:spAutoFit/>
-          </a:bodyPr>
-          <a:lstStyle/>
-          <a:p>
-            <a:pPr algn="ctr"/>
-            <a:r>
-              <a:rPr lang="en-US" sz="3600" dirty="0" smtClean="0">
-                <a:solidFill>
-                  <a:srgbClr val="FFFF00"/>
-                </a:solidFill>
-              </a:rPr>
-              <a:t>Wisdom of the crowd</a:t>
-            </a:r>
-          </a:p>
-          <a:p>
-            <a:pPr algn="ctr"/>
-            <a:endParaRPr lang="en-US" sz="2800" dirty="0" smtClean="0">
-              <a:solidFill>
-                <a:srgbClr val="FFFFFF"/>
-              </a:solidFill>
-            </a:endParaRPr>
-          </a:p>
-          <a:p>
-            <a:pPr algn="ctr"/>
-            <a:r>
-              <a:rPr lang="en-US" sz="2800" dirty="0" smtClean="0">
-                <a:solidFill>
-                  <a:srgbClr val="FFFFFF"/>
-                </a:solidFill>
-              </a:rPr>
-              <a:t>The collective opinion of a crowd</a:t>
-            </a:r>
-          </a:p>
-          <a:p>
-            <a:pPr algn="ctr"/>
-            <a:r>
-              <a:rPr lang="en-US" sz="2800" dirty="0" smtClean="0">
-                <a:solidFill>
-                  <a:srgbClr val="FFFFFF"/>
-                </a:solidFill>
-              </a:rPr>
-              <a:t>can outperform the judgments</a:t>
-            </a:r>
-          </a:p>
-          <a:p>
-            <a:pPr algn="ctr"/>
-            <a:r>
-              <a:rPr lang="en-US" sz="2800" dirty="0" smtClean="0">
-                <a:solidFill>
-                  <a:srgbClr val="FFFFFF"/>
-                </a:solidFill>
-              </a:rPr>
-              <a:t>of any one individual</a:t>
-            </a:r>
-          </a:p>
-        </p:txBody>
-      </p:sp>
-    </p:spTree>
-    <p:extLst>
-      <p:ext uri="{BB962C8B-B14F-4D97-AF65-F5344CB8AC3E}">
-        <p14:creationId xmlns:p14="http://schemas.microsoft.com/office/powerpoint/2010/main" val="3151369419"/>
-      </p:ext>
-    </p:extLst>
-  </p:cSld>
-  <p:clrMapOvr>
-    <a:masterClrMapping/>
-  </p:clrMapOvr>
-</p:sld>
-</file>
-
 <file path=ppt/slides/slide8.xml><?xml version="1.0" encoding="utf-8"?>
 <p:sld xmlns:a="http://schemas.openxmlformats.org/drawingml/2006/main" xmlns:r="http://schemas.openxmlformats.org/officeDocument/2006/relationships" xmlns:p="http://schemas.openxmlformats.org/presentationml/2006/main">
   <p:cSld>
@@ -6625,8 +6777,8 @@
         </p:nvSpPr>
         <p:spPr>
           <a:xfrm>
-            <a:off x="2660853" y="1043732"/>
-            <a:ext cx="3822305" cy="3231654"/>
+            <a:off x="2070835" y="1043732"/>
+            <a:ext cx="5002341" cy="2369880"/>
           </a:xfrm>
           <a:prstGeom prst="rect">
             <a:avLst/>
@@ -6646,8 +6798,16 @@
                   <a:srgbClr val="FFFF00"/>
                 </a:solidFill>
               </a:rPr>
-              <a:t>Madness of crowds</a:t>
-            </a:r>
+              <a:t>Wisdom of the crowd</a:t>
+            </a:r>
+          </a:p>
+          <a:p>
+            <a:pPr algn="ctr"/>
+            <a:endParaRPr lang="en-US" sz="2800" dirty="0" smtClean="0">
+              <a:solidFill>
+                <a:srgbClr val="FFFFFF"/>
+              </a:solidFill>
+            </a:endParaRPr>
           </a:p>
           <a:p>
             <a:pPr algn="ctr"/>
@@ -6657,16 +6817,8 @@
                   <a:srgbClr val="FFFFFF"/>
                 </a:solidFill>
               </a:rPr>
-              <a:t>Charles Mackay</a:t>
-            </a:r>
-          </a:p>
-          <a:p>
-            <a:pPr algn="ctr"/>
-            <a:endParaRPr lang="en-US" sz="2800" dirty="0" smtClean="0">
-              <a:solidFill>
-                <a:srgbClr val="FFFFFF"/>
-              </a:solidFill>
-            </a:endParaRPr>
+              <a:t>The collective opinion of a crowd</a:t>
+            </a:r>
           </a:p>
           <a:p>
             <a:pPr algn="ctr"/>
@@ -6676,7 +6828,7 @@
                   <a:srgbClr val="FFFFFF"/>
                 </a:solidFill>
               </a:rPr>
-              <a:t>riots</a:t>
+              <a:t>can outperform the judgments</a:t>
             </a:r>
           </a:p>
           <a:p>
@@ -6687,29 +6839,7 @@
                   <a:srgbClr val="FFFFFF"/>
                 </a:solidFill>
               </a:rPr>
-              <a:t>economic bubbles</a:t>
-            </a:r>
-          </a:p>
-          <a:p>
-            <a:pPr algn="ctr"/>
-            <a:r>
-              <a:rPr lang="en-US" sz="2800" dirty="0" smtClean="0">
-                <a:solidFill>
-                  <a:srgbClr val="FFFFFF"/>
-                </a:solidFill>
-              </a:rPr>
-              <a:t>mass hysteria</a:t>
-            </a:r>
-          </a:p>
-          <a:p>
-            <a:pPr algn="ctr"/>
-            <a:r>
-              <a:rPr lang="en-US" sz="2800" dirty="0" smtClean="0">
-                <a:solidFill>
-                  <a:srgbClr val="FFFFFF"/>
-                </a:solidFill>
-              </a:rPr>
-              <a:t>herding</a:t>
+              <a:t>of any one individual</a:t>
             </a:r>
           </a:p>
         </p:txBody>
@@ -6717,7 +6847,7 @@
     </p:spTree>
     <p:extLst>
       <p:ext uri="{BB962C8B-B14F-4D97-AF65-F5344CB8AC3E}">
-        <p14:creationId xmlns:p14="http://schemas.microsoft.com/office/powerpoint/2010/main" val="2326426590"/>
+        <p14:creationId xmlns:p14="http://schemas.microsoft.com/office/powerpoint/2010/main" val="3151369419"/>
       </p:ext>
     </p:extLst>
   </p:cSld>
@@ -6752,8 +6882,8 @@
         </p:nvSpPr>
         <p:spPr>
           <a:xfrm>
-            <a:off x="2593677" y="1043732"/>
-            <a:ext cx="3956682" cy="1631216"/>
+            <a:off x="2660853" y="1043732"/>
+            <a:ext cx="3822305" cy="3231654"/>
           </a:xfrm>
           <a:prstGeom prst="rect">
             <a:avLst/>
@@ -6773,22 +6903,70 @@
                   <a:srgbClr val="FFFF00"/>
                 </a:solidFill>
               </a:rPr>
-              <a:t>Research question</a:t>
-            </a:r>
-          </a:p>
-          <a:p>
-            <a:pPr algn="ctr"/>
-            <a:endParaRPr lang="en-US" sz="3600" dirty="0" smtClean="0">
+              <a:t>Madness of crowds</a:t>
+            </a:r>
+          </a:p>
+          <a:p>
+            <a:pPr algn="ctr"/>
+            <a:r>
+              <a:rPr lang="en-US" sz="2800" dirty="0" smtClean="0">
+                <a:solidFill>
+                  <a:srgbClr val="FFFFFF"/>
+                </a:solidFill>
+              </a:rPr>
+              <a:t>Charles Mackay</a:t>
+            </a:r>
+          </a:p>
+          <a:p>
+            <a:pPr algn="ctr"/>
+            <a:endParaRPr lang="en-US" sz="2800" dirty="0" smtClean="0">
               <a:solidFill>
-                <a:srgbClr val="FFFF00"/>
+                <a:srgbClr val="FFFFFF"/>
               </a:solidFill>
             </a:endParaRPr>
           </a:p>
           <a:p>
             <a:pPr algn="ctr"/>
             <a:r>
-              <a:rPr lang="en-US" sz="2800" dirty="0" smtClean="0"/>
-              <a:t>When are crowds “wise”?</a:t>
+              <a:rPr lang="en-US" sz="2800" dirty="0" smtClean="0">
+                <a:solidFill>
+                  <a:srgbClr val="FFFFFF"/>
+                </a:solidFill>
+              </a:rPr>
+              <a:t>riots</a:t>
+            </a:r>
+          </a:p>
+          <a:p>
+            <a:pPr algn="ctr"/>
+            <a:r>
+              <a:rPr lang="en-US" sz="2800" dirty="0" smtClean="0">
+                <a:solidFill>
+                  <a:srgbClr val="FFFFFF"/>
+                </a:solidFill>
+              </a:rPr>
+              <a:t>economic bubbles</a:t>
+            </a:r>
+          </a:p>
+          <a:p>
+            <a:pPr algn="ctr"/>
+            <a:r>
+              <a:rPr lang="en-US" sz="2800" dirty="0" smtClean="0">
+                <a:solidFill>
+                  <a:srgbClr val="FFFFFF"/>
+                </a:solidFill>
+              </a:rPr>
+              <a:t>mass hysteria</a:t>
+            </a:r>
+          </a:p>
+          <a:p>
+            <a:pPr algn="ctr"/>
+            <a:r>
+              <a:rPr lang="en-US" sz="2800" dirty="0" smtClean="0">
+                <a:solidFill>
+                  <a:srgbClr val="FFFFFF"/>
+                </a:solidFill>
+              </a:rPr>
+              <a:t>herding</a:t>
             </a:r>
           </a:p>
         </p:txBody>
@@ -6796,7 +6974,7 @@
     </p:spTree>
     <p:extLst>
       <p:ext uri="{BB962C8B-B14F-4D97-AF65-F5344CB8AC3E}">
-        <p14:creationId xmlns:p14="http://schemas.microsoft.com/office/powerpoint/2010/main" val="3004424881"/>
+        <p14:creationId xmlns:p14="http://schemas.microsoft.com/office/powerpoint/2010/main" val="2326426590"/>
       </p:ext>
     </p:extLst>
   </p:cSld>

</xml_diff>

<commit_message>
added lecture 2 slides
</commit_message>
<xml_diff>
--- a/slides/lecture_1.pptx
+++ b/slides/lecture_1.pptx
@@ -215,7 +215,7 @@
           <a:p>
             <a:fld id="{0A92C876-EF44-8A4B-8C53-99726796C231}" type="datetimeFigureOut">
               <a:rPr lang="en-US" smtClean="0"/>
-              <a:t>2/13/15</a:t>
+              <a:t>2/19/15</a:t>
             </a:fld>
             <a:endParaRPr lang="en-US"/>
           </a:p>
@@ -1167,7 +1167,7 @@
           <a:p>
             <a:fld id="{6BFECD78-3C8E-49F2-8FAB-59489D168ABB}" type="datetimeFigureOut">
               <a:rPr lang="en-US" smtClean="0"/>
-              <a:t>2/13/15</a:t>
+              <a:t>2/19/15</a:t>
             </a:fld>
             <a:endParaRPr lang="en-US"/>
           </a:p>
@@ -1337,7 +1337,7 @@
           <a:p>
             <a:fld id="{6BFECD78-3C8E-49F2-8FAB-59489D168ABB}" type="datetimeFigureOut">
               <a:rPr lang="en-US" smtClean="0"/>
-              <a:t>2/13/15</a:t>
+              <a:t>2/19/15</a:t>
             </a:fld>
             <a:endParaRPr lang="en-US"/>
           </a:p>
@@ -1517,7 +1517,7 @@
           <a:p>
             <a:fld id="{6BFECD78-3C8E-49F2-8FAB-59489D168ABB}" type="datetimeFigureOut">
               <a:rPr lang="en-US" smtClean="0"/>
-              <a:t>2/13/15</a:t>
+              <a:t>2/19/15</a:t>
             </a:fld>
             <a:endParaRPr lang="en-US"/>
           </a:p>
@@ -1687,7 +1687,7 @@
           <a:p>
             <a:fld id="{6BFECD78-3C8E-49F2-8FAB-59489D168ABB}" type="datetimeFigureOut">
               <a:rPr lang="en-US" smtClean="0"/>
-              <a:t>2/13/15</a:t>
+              <a:t>2/19/15</a:t>
             </a:fld>
             <a:endParaRPr lang="en-US"/>
           </a:p>
@@ -1933,7 +1933,7 @@
           <a:p>
             <a:fld id="{6BFECD78-3C8E-49F2-8FAB-59489D168ABB}" type="datetimeFigureOut">
               <a:rPr lang="en-US" smtClean="0"/>
-              <a:t>2/13/15</a:t>
+              <a:t>2/19/15</a:t>
             </a:fld>
             <a:endParaRPr lang="en-US"/>
           </a:p>
@@ -2221,7 +2221,7 @@
           <a:p>
             <a:fld id="{6BFECD78-3C8E-49F2-8FAB-59489D168ABB}" type="datetimeFigureOut">
               <a:rPr lang="en-US" smtClean="0"/>
-              <a:t>2/13/15</a:t>
+              <a:t>2/19/15</a:t>
             </a:fld>
             <a:endParaRPr lang="en-US"/>
           </a:p>
@@ -2643,7 +2643,7 @@
           <a:p>
             <a:fld id="{6BFECD78-3C8E-49F2-8FAB-59489D168ABB}" type="datetimeFigureOut">
               <a:rPr lang="en-US" smtClean="0"/>
-              <a:t>2/13/15</a:t>
+              <a:t>2/19/15</a:t>
             </a:fld>
             <a:endParaRPr lang="en-US"/>
           </a:p>
@@ -2761,7 +2761,7 @@
           <a:p>
             <a:fld id="{6BFECD78-3C8E-49F2-8FAB-59489D168ABB}" type="datetimeFigureOut">
               <a:rPr lang="en-US" smtClean="0"/>
-              <a:t>2/13/15</a:t>
+              <a:t>2/19/15</a:t>
             </a:fld>
             <a:endParaRPr lang="en-US"/>
           </a:p>
@@ -2856,7 +2856,7 @@
           <a:p>
             <a:fld id="{6BFECD78-3C8E-49F2-8FAB-59489D168ABB}" type="datetimeFigureOut">
               <a:rPr lang="en-US" smtClean="0"/>
-              <a:t>2/13/15</a:t>
+              <a:t>2/19/15</a:t>
             </a:fld>
             <a:endParaRPr lang="en-US"/>
           </a:p>
@@ -3133,7 +3133,7 @@
           <a:p>
             <a:fld id="{6BFECD78-3C8E-49F2-8FAB-59489D168ABB}" type="datetimeFigureOut">
               <a:rPr lang="en-US" smtClean="0"/>
-              <a:t>2/13/15</a:t>
+              <a:t>2/19/15</a:t>
             </a:fld>
             <a:endParaRPr lang="en-US"/>
           </a:p>
@@ -3390,7 +3390,7 @@
           <a:p>
             <a:fld id="{6BFECD78-3C8E-49F2-8FAB-59489D168ABB}" type="datetimeFigureOut">
               <a:rPr lang="en-US" smtClean="0"/>
-              <a:t>2/13/15</a:t>
+              <a:t>2/19/15</a:t>
             </a:fld>
             <a:endParaRPr lang="en-US"/>
           </a:p>
@@ -3603,7 +3603,7 @@
           <a:p>
             <a:fld id="{6BFECD78-3C8E-49F2-8FAB-59489D168ABB}" type="datetimeFigureOut">
               <a:rPr lang="en-US" smtClean="0"/>
-              <a:t>2/13/15</a:t>
+              <a:t>2/19/15</a:t>
             </a:fld>
             <a:endParaRPr lang="en-US"/>
           </a:p>
@@ -4007,6 +4007,12 @@
                 </a:solidFill>
               </a:rPr>
               <a:t>Exploring the Wisdom of Crowds</a:t>
+            </a:r>
+          </a:p>
+          <a:p>
+            <a:r>
+              <a:rPr lang="en-US" dirty="0"/>
+              <a:t>Week 2</a:t>
             </a:r>
           </a:p>
           <a:p>

</xml_diff>